<commit_message>
20210823 1-1.Cognitive Science by Issac 오타수정
</commit_message>
<xml_diff>
--- a/1-2.Cognitive Science.pptx
+++ b/1-2.Cognitive Science.pptx
@@ -2,7 +2,7 @@
 <file path=ppt/presentation.xml><?xml version="1.0" encoding="utf-8"?>
 <p:presentation xmlns:r="http://schemas.openxmlformats.org/officeDocument/2006/relationships" xmlns:c="http://schemas.openxmlformats.org/drawingml/2006/chart" xmlns:a="http://schemas.openxmlformats.org/drawingml/2006/main" xmlns:dgm="http://schemas.openxmlformats.org/drawingml/2006/diagram" xmlns:dsp="http://schemas.microsoft.com/office/drawing/2008/diagram" xmlns:p="http://schemas.openxmlformats.org/presentationml/2006/main">
   <p:sldMasterIdLst>
-    <p:sldMasterId id="2147483718" r:id="rId1"/>
+    <p:sldMasterId id="2147483721" r:id="rId1"/>
   </p:sldMasterIdLst>
   <p:notesMasterIdLst>
     <p:notesMasterId r:id="rId2"/>
@@ -19,10 +19,9 @@
     <p:sldId id="277" r:id="rId11"/>
     <p:sldId id="259" r:id="rId12"/>
     <p:sldId id="278" r:id="rId13"/>
-    <p:sldId id="279" r:id="rId14"/>
-    <p:sldId id="280" r:id="rId15"/>
-    <p:sldId id="268" r:id="rId16"/>
-    <p:sldId id="271" r:id="rId17"/>
+    <p:sldId id="280" r:id="rId14"/>
+    <p:sldId id="268" r:id="rId15"/>
+    <p:sldId id="271" r:id="rId16"/>
   </p:sldIdLst>
   <p:sldSz cx="12192000" cy="6858000"/>
   <p:notesSz cx="6858000" cy="9144000"/>
@@ -225,7 +224,7 @@
               <a:pPr lvl="0">
                 <a:defRPr/>
               </a:pPr>
-              <a:t>2021-08-21</a:t>
+              <a:t>2021-08-23</a:t>
             </a:fld>
             <a:endParaRPr lang="ko-KR" altLang="en-US"/>
           </a:p>
@@ -4198,11 +4197,18 @@
               <a:defRPr/>
             </a:pPr>
             <a:r>
+              <a:rPr lang="ko-KR" altLang="en-US">
+                <a:latin typeface="안상수2006굵은"/>
+                <a:ea typeface="안상수2006굵은"/>
+              </a:rPr>
+              <a:t>신경생물학 방법(Neurobiological methods</a:t>
+            </a:r>
+            <a:r>
               <a:rPr lang="en-US" altLang="ko-KR">
                 <a:latin typeface="안상수2006굵은"/>
                 <a:ea typeface="안상수2006굵은"/>
               </a:rPr>
-              <a:t>뇌 이미징 (Brain imaging)</a:t>
+              <a:t>)</a:t>
             </a:r>
             <a:endParaRPr lang="en-US" altLang="ko-KR">
               <a:latin typeface="안상수2006굵은"/>
@@ -4219,28 +4225,62 @@
                 <a:latin typeface="안상수2006굵은"/>
                 <a:ea typeface="안상수2006굵은"/>
               </a:rPr>
-              <a:t>    : </a:t>
-            </a:r>
+              <a:t>    : 신경과학과 신경심리학으로부터 직접적으로 차용된 연구 방법을 통해서 </a:t>
+            </a:r>
+            <a:endParaRPr lang="en-US" altLang="ko-KR">
+              <a:latin typeface="안상수2006굵은"/>
+              <a:ea typeface="안상수2006굵은"/>
+            </a:endParaRPr>
+          </a:p>
+          <a:p>
+            <a:pPr marL="0" indent="0">
+              <a:buNone/>
+              <a:defRPr/>
+            </a:pPr>
             <a:r>
               <a:rPr lang="ko-KR" altLang="en-US">
                 <a:latin typeface="안상수2006굵은"/>
                 <a:ea typeface="안상수2006굵은"/>
               </a:rPr>
-              <a:t>다</a:t>
+              <a:t>      </a:t>
             </a:r>
             <a:r>
               <a:rPr lang="en-US" altLang="ko-KR">
                 <a:latin typeface="안상수2006굵은"/>
                 <a:ea typeface="안상수2006굵은"/>
               </a:rPr>
-              <a:t>양한 작업을 수행하는 도중에 두뇌 안에서의 활동을 분석하는 </a:t>
-            </a:r>
+              <a:t>지능의 여러 특성을 이해</a:t>
+            </a:r>
+            <a:endParaRPr lang="en-US" altLang="ko-KR">
+              <a:latin typeface="안상수2006굵은"/>
+              <a:ea typeface="안상수2006굵은"/>
+            </a:endParaRPr>
+          </a:p>
+          <a:p>
+            <a:pPr marL="0" indent="0">
+              <a:buNone/>
+              <a:defRPr/>
+            </a:pPr>
             <a:r>
               <a:rPr lang="ko-KR" altLang="en-US">
                 <a:latin typeface="안상수2006굵은"/>
                 <a:ea typeface="안상수2006굵은"/>
               </a:rPr>
-              <a:t>것</a:t>
+              <a:t>    </a:t>
+            </a:r>
+            <a:r>
+              <a:rPr lang="en-US" altLang="ko-KR">
+                <a:latin typeface="안상수2006굵은"/>
+                <a:ea typeface="안상수2006굵은"/>
+              </a:rPr>
+              <a:t>:</a:t>
+            </a:r>
+            <a:r>
+              <a:rPr lang="ko-KR" altLang="en-US">
+                <a:latin typeface="안상수2006굵은"/>
+                <a:ea typeface="안상수2006굵은"/>
+              </a:rPr>
+              <a:t> 지능적 행동이 물리적 시스템에 어떻게 구현되는 지를 알 수 있음</a:t>
             </a:r>
             <a:endParaRPr lang="ko-KR" altLang="en-US">
               <a:latin typeface="안상수2006굵은"/>
@@ -4252,27 +4292,6 @@
               <a:buNone/>
               <a:defRPr/>
             </a:pPr>
-            <a:r>
-              <a:rPr lang="ko-KR" altLang="en-US">
-                <a:latin typeface="안상수2006굵은"/>
-                <a:ea typeface="안상수2006굵은"/>
-              </a:rPr>
-              <a:t>    </a:t>
-            </a:r>
-            <a:r>
-              <a:rPr lang="en-US" altLang="ko-KR">
-                <a:latin typeface="안상수2006굵은"/>
-                <a:ea typeface="안상수2006굵은"/>
-              </a:rPr>
-              <a:t>:</a:t>
-            </a:r>
-            <a:r>
-              <a:rPr lang="ko-KR" altLang="en-US">
-                <a:latin typeface="안상수2006굵은"/>
-                <a:ea typeface="안상수2006굵은"/>
-              </a:rPr>
-              <a:t>  우리는 특정한 인지 현상의 기능적 조직을 이해</a:t>
-            </a:r>
             <a:endParaRPr lang="ko-KR" altLang="en-US">
               <a:latin typeface="안상수2006굵은"/>
               <a:ea typeface="안상수2006굵은"/>
@@ -4333,15 +4352,7 @@
             </a:pPr>
             <a:r>
               <a:rPr lang="en-US" altLang="ko-KR"/>
-              <a:t>3.</a:t>
-            </a:r>
-            <a:r>
-              <a:rPr lang="ko-KR" altLang="en-US"/>
-              <a:t> </a:t>
-            </a:r>
-            <a:r>
-              <a:rPr lang="en-US" altLang="ko-KR"/>
-              <a:t>Methods of CG Research</a:t>
+              <a:t>4. Example CG </a:t>
             </a:r>
             <a:endParaRPr lang="en-US" altLang="ko-KR"/>
           </a:p>
@@ -4359,8 +4370,8 @@
         </p:nvSpPr>
         <p:spPr>
           <a:xfrm>
-            <a:off x="609601" y="2277268"/>
-            <a:ext cx="10972798" cy="2303464"/>
+            <a:off x="0" y="1417638"/>
+            <a:ext cx="12192000" cy="5440362"/>
           </a:xfrm>
         </p:spPr>
         <p:txBody>
@@ -4377,86 +4388,7 @@
                 <a:latin typeface="안상수2006굵은"/>
                 <a:ea typeface="안상수2006굵은"/>
               </a:rPr>
-              <a:t>신경생물학 방법(Neurobiological methods</a:t>
-            </a:r>
-            <a:r>
-              <a:rPr lang="en-US" altLang="ko-KR">
-                <a:latin typeface="안상수2006굵은"/>
-                <a:ea typeface="안상수2006굵은"/>
-              </a:rPr>
-              <a:t>)</a:t>
-            </a:r>
-            <a:endParaRPr lang="en-US" altLang="ko-KR">
-              <a:latin typeface="안상수2006굵은"/>
-              <a:ea typeface="안상수2006굵은"/>
-            </a:endParaRPr>
-          </a:p>
-          <a:p>
-            <a:pPr marL="0" indent="0">
-              <a:buNone/>
-              <a:defRPr/>
-            </a:pPr>
-            <a:r>
-              <a:rPr lang="en-US" altLang="ko-KR">
-                <a:latin typeface="안상수2006굵은"/>
-                <a:ea typeface="안상수2006굵은"/>
-              </a:rPr>
-              <a:t>    : 신경과학과 신경심리학으로부터 직접적으로 차용된 연구 방법을 통해서 </a:t>
-            </a:r>
-            <a:endParaRPr lang="en-US" altLang="ko-KR">
-              <a:latin typeface="안상수2006굵은"/>
-              <a:ea typeface="안상수2006굵은"/>
-            </a:endParaRPr>
-          </a:p>
-          <a:p>
-            <a:pPr marL="0" indent="0">
-              <a:buNone/>
-              <a:defRPr/>
-            </a:pPr>
-            <a:r>
-              <a:rPr lang="ko-KR" altLang="en-US">
-                <a:latin typeface="안상수2006굵은"/>
-                <a:ea typeface="안상수2006굵은"/>
-              </a:rPr>
-              <a:t>      </a:t>
-            </a:r>
-            <a:r>
-              <a:rPr lang="en-US" altLang="ko-KR">
-                <a:latin typeface="안상수2006굵은"/>
-                <a:ea typeface="안상수2006굵은"/>
-              </a:rPr>
-              <a:t>지능의 여러 특성을 이해</a:t>
-            </a:r>
-            <a:endParaRPr lang="en-US" altLang="ko-KR">
-              <a:latin typeface="안상수2006굵은"/>
-              <a:ea typeface="안상수2006굵은"/>
-            </a:endParaRPr>
-          </a:p>
-          <a:p>
-            <a:pPr marL="0" indent="0">
-              <a:buNone/>
-              <a:defRPr/>
-            </a:pPr>
-            <a:r>
-              <a:rPr lang="ko-KR" altLang="en-US">
-                <a:latin typeface="안상수2006굵은"/>
-                <a:ea typeface="안상수2006굵은"/>
-              </a:rPr>
-              <a:t>    </a:t>
-            </a:r>
-            <a:r>
-              <a:rPr lang="en-US" altLang="ko-KR">
-                <a:latin typeface="안상수2006굵은"/>
-                <a:ea typeface="안상수2006굵은"/>
-              </a:rPr>
-              <a:t>:</a:t>
-            </a:r>
-            <a:r>
-              <a:rPr lang="ko-KR" altLang="en-US">
-                <a:latin typeface="안상수2006굵은"/>
-                <a:ea typeface="안상수2006굵은"/>
-              </a:rPr>
-              <a:t> 지능적 행동이 물리적 시스템에 어떻게 구현되는 지를 알 수 있음</a:t>
+              <a:t>인간의 인지 편향과 위험 지각 모형 탄생</a:t>
             </a:r>
             <a:endParaRPr lang="ko-KR" altLang="en-US">
               <a:latin typeface="안상수2006굵은"/>
@@ -4467,6 +4399,254 @@
             <a:pPr>
               <a:defRPr/>
             </a:pPr>
+            <a:r>
+              <a:rPr lang="ko-KR" altLang="en-US">
+                <a:latin typeface="안상수2006굵은"/>
+                <a:ea typeface="안상수2006굵은"/>
+              </a:rPr>
+              <a:t>경제학 </a:t>
+            </a:r>
+            <a:endParaRPr lang="ko-KR" altLang="en-US">
+              <a:latin typeface="안상수2006굵은"/>
+              <a:ea typeface="안상수2006굵은"/>
+            </a:endParaRPr>
+          </a:p>
+          <a:p>
+            <a:pPr marL="0" indent="0">
+              <a:buNone/>
+              <a:defRPr/>
+            </a:pPr>
+            <a:r>
+              <a:rPr lang="ko-KR" altLang="en-US">
+                <a:latin typeface="안상수2006굵은"/>
+                <a:ea typeface="안상수2006굵은"/>
+              </a:rPr>
+              <a:t>  </a:t>
+            </a:r>
+            <a:r>
+              <a:rPr lang="en-US" altLang="ko-KR">
+                <a:latin typeface="안상수2006굵은"/>
+                <a:ea typeface="안상수2006굵은"/>
+              </a:rPr>
+              <a:t>-</a:t>
+            </a:r>
+            <a:r>
+              <a:rPr lang="ko-KR" altLang="en-US">
+                <a:latin typeface="안상수2006굵은"/>
+                <a:ea typeface="안상수2006굵은"/>
+              </a:rPr>
+              <a:t> 행동 재무의 개발</a:t>
+            </a:r>
+            <a:endParaRPr lang="ko-KR" altLang="en-US">
+              <a:latin typeface="안상수2006굵은"/>
+              <a:ea typeface="안상수2006굵은"/>
+            </a:endParaRPr>
+          </a:p>
+          <a:p>
+            <a:pPr>
+              <a:defRPr/>
+            </a:pPr>
+            <a:r>
+              <a:rPr lang="ko-KR" altLang="en-US">
+                <a:latin typeface="안상수2006굵은"/>
+                <a:ea typeface="안상수2006굵은"/>
+              </a:rPr>
+              <a:t>수리철학</a:t>
+            </a:r>
+            <a:endParaRPr lang="ko-KR" altLang="en-US">
+              <a:latin typeface="안상수2006굵은"/>
+              <a:ea typeface="안상수2006굵은"/>
+            </a:endParaRPr>
+          </a:p>
+          <a:p>
+            <a:pPr marL="0" indent="0">
+              <a:buNone/>
+              <a:defRPr/>
+            </a:pPr>
+            <a:r>
+              <a:rPr lang="ko-KR" altLang="en-US">
+                <a:latin typeface="안상수2006굵은"/>
+                <a:ea typeface="안상수2006굵은"/>
+              </a:rPr>
+              <a:t>  </a:t>
+            </a:r>
+            <a:r>
+              <a:rPr lang="en-US" altLang="ko-KR">
+                <a:latin typeface="안상수2006굵은"/>
+                <a:ea typeface="안상수2006굵은"/>
+              </a:rPr>
+              <a:t>-</a:t>
+            </a:r>
+            <a:r>
+              <a:rPr lang="ko-KR" altLang="en-US">
+                <a:latin typeface="안상수2006굵은"/>
+                <a:ea typeface="안상수2006굵은"/>
+              </a:rPr>
+              <a:t> 인공지능</a:t>
+            </a:r>
+            <a:r>
+              <a:rPr lang="en-US" altLang="ko-KR">
+                <a:latin typeface="안상수2006굵은"/>
+                <a:ea typeface="안상수2006굵은"/>
+              </a:rPr>
+              <a:t>,</a:t>
+            </a:r>
+            <a:r>
+              <a:rPr lang="ko-KR" altLang="en-US">
+                <a:latin typeface="안상수2006굵은"/>
+                <a:ea typeface="안상수2006굵은"/>
+              </a:rPr>
+              <a:t> 설득과 강압의 많은 이론 탄생</a:t>
+            </a:r>
+            <a:endParaRPr lang="ko-KR" altLang="en-US">
+              <a:latin typeface="안상수2006굵은"/>
+              <a:ea typeface="안상수2006굵은"/>
+            </a:endParaRPr>
+          </a:p>
+          <a:p>
+            <a:pPr>
+              <a:defRPr/>
+            </a:pPr>
+            <a:r>
+              <a:rPr lang="ko-KR" altLang="en-US">
+                <a:latin typeface="안상수2006굵은"/>
+                <a:ea typeface="안상수2006굵은"/>
+              </a:rPr>
+              <a:t>언어철학과 인식론</a:t>
+            </a:r>
+            <a:endParaRPr lang="ko-KR" altLang="en-US">
+              <a:latin typeface="안상수2006굵은"/>
+              <a:ea typeface="안상수2006굵은"/>
+            </a:endParaRPr>
+          </a:p>
+          <a:p>
+            <a:pPr marL="0" indent="0">
+              <a:buNone/>
+              <a:defRPr/>
+            </a:pPr>
+            <a:r>
+              <a:rPr lang="ko-KR" altLang="en-US">
+                <a:latin typeface="안상수2006굵은"/>
+                <a:ea typeface="안상수2006굵은"/>
+              </a:rPr>
+              <a:t>  </a:t>
+            </a:r>
+            <a:r>
+              <a:rPr lang="en-US" altLang="ko-KR">
+                <a:latin typeface="안상수2006굵은"/>
+                <a:ea typeface="안상수2006굵은"/>
+              </a:rPr>
+              <a:t>-</a:t>
+            </a:r>
+            <a:r>
+              <a:rPr lang="ko-KR" altLang="en-US">
+                <a:latin typeface="안상수2006굵은"/>
+                <a:ea typeface="안상수2006굵은"/>
+              </a:rPr>
+              <a:t> 현대 언어학의 중대한 계파 구성</a:t>
+            </a:r>
+            <a:endParaRPr lang="ko-KR" altLang="en-US">
+              <a:latin typeface="안상수2006굵은"/>
+              <a:ea typeface="안상수2006굵은"/>
+            </a:endParaRPr>
+          </a:p>
+          <a:p>
+            <a:pPr>
+              <a:defRPr/>
+            </a:pPr>
+            <a:r>
+              <a:rPr lang="ko-KR" altLang="en-US">
+                <a:latin typeface="안상수2006굵은"/>
+                <a:ea typeface="안상수2006굵은"/>
+              </a:rPr>
+              <a:t>말</a:t>
+            </a:r>
+            <a:r>
+              <a:rPr lang="en-US" altLang="ko-KR">
+                <a:latin typeface="안상수2006굵은"/>
+                <a:ea typeface="안상수2006굵은"/>
+              </a:rPr>
+              <a:t>,</a:t>
+            </a:r>
+            <a:r>
+              <a:rPr lang="ko-KR" altLang="en-US">
+                <a:latin typeface="안상수2006굵은"/>
+                <a:ea typeface="안상수2006굵은"/>
+              </a:rPr>
+              <a:t> 청각적 처리</a:t>
+            </a:r>
+            <a:r>
+              <a:rPr lang="en-US" altLang="ko-KR">
+                <a:latin typeface="안상수2006굵은"/>
+                <a:ea typeface="안상수2006굵은"/>
+              </a:rPr>
+              <a:t>,</a:t>
+            </a:r>
+            <a:r>
+              <a:rPr lang="ko-KR" altLang="en-US">
+                <a:latin typeface="안상수2006굵은"/>
+                <a:ea typeface="안상수2006굵은"/>
+              </a:rPr>
+              <a:t> 시각적 지각까지 뇌의 특정 기능적 시스템 및 장애를 이해하는데 영향</a:t>
+            </a:r>
+            <a:endParaRPr lang="ko-KR" altLang="en-US">
+              <a:latin typeface="안상수2006굵은"/>
+              <a:ea typeface="안상수2006굵은"/>
+            </a:endParaRPr>
+          </a:p>
+          <a:p>
+            <a:pPr>
+              <a:defRPr/>
+            </a:pPr>
+            <a:r>
+              <a:rPr lang="ko-KR" altLang="en-US">
+                <a:latin typeface="안상수2006굵은"/>
+                <a:ea typeface="안상수2006굵은"/>
+              </a:rPr>
+              <a:t>난독증</a:t>
+            </a:r>
+            <a:r>
+              <a:rPr lang="en-US" altLang="ko-KR">
+                <a:latin typeface="안상수2006굵은"/>
+                <a:ea typeface="안상수2006굵은"/>
+              </a:rPr>
+              <a:t>,</a:t>
+            </a:r>
+            <a:r>
+              <a:rPr lang="ko-KR" altLang="en-US">
+                <a:latin typeface="안상수2006굵은"/>
+                <a:ea typeface="안상수2006굵은"/>
+              </a:rPr>
+              <a:t> 시각결여</a:t>
+            </a:r>
+            <a:r>
+              <a:rPr lang="en-US" altLang="ko-KR">
+                <a:latin typeface="안상수2006굵은"/>
+                <a:ea typeface="안상수2006굵은"/>
+              </a:rPr>
+              <a:t>(</a:t>
+            </a:r>
+            <a:r>
+              <a:rPr lang="ko-KR" altLang="en-US">
+                <a:latin typeface="안상수2006굵은"/>
+                <a:ea typeface="안상수2006굵은"/>
+              </a:rPr>
+              <a:t>무시증</a:t>
+            </a:r>
+            <a:r>
+              <a:rPr lang="en-US" altLang="ko-KR">
+                <a:latin typeface="안상수2006굵은"/>
+                <a:ea typeface="안상수2006굵은"/>
+              </a:rPr>
+              <a:t>),</a:t>
+            </a:r>
+            <a:r>
+              <a:rPr lang="ko-KR" altLang="en-US">
+                <a:latin typeface="안상수2006굵은"/>
+                <a:ea typeface="안상수2006굵은"/>
+              </a:rPr>
+              <a:t> 편측공간무시와 같은 특정 기능 장애의 결과와 근본 원인을 밝혀내는데 도움</a:t>
+            </a:r>
             <a:endParaRPr lang="ko-KR" altLang="en-US">
               <a:latin typeface="안상수2006굵은"/>
               <a:ea typeface="안상수2006굵은"/>
@@ -4527,7 +4707,7 @@
             </a:pPr>
             <a:r>
               <a:rPr lang="en-US" altLang="ko-KR"/>
-              <a:t>4. Example CG </a:t>
+              <a:t>4. Example CG</a:t>
             </a:r>
             <a:endParaRPr lang="en-US" altLang="ko-KR"/>
           </a:p>
@@ -4545,25 +4725,23 @@
         </p:nvSpPr>
         <p:spPr>
           <a:xfrm>
-            <a:off x="0" y="1417638"/>
-            <a:ext cx="12192000" cy="5440362"/>
+            <a:off x="609601" y="1997074"/>
+            <a:ext cx="10972798" cy="4525963"/>
           </a:xfrm>
         </p:spPr>
         <p:txBody>
-          <a:bodyPr>
-            <a:normAutofit lnSpcReduction="10000"/>
-          </a:bodyPr>
+          <a:bodyPr/>
           <a:lstStyle/>
           <a:p>
             <a:pPr>
               <a:defRPr/>
             </a:pPr>
             <a:r>
-              <a:rPr lang="ko-KR" altLang="en-US">
-                <a:latin typeface="안상수2006굵은"/>
-                <a:ea typeface="안상수2006굵은"/>
-              </a:rPr>
-              <a:t>인간의 인지 편향과 위험 지각 모형 탄생</a:t>
+              <a:rPr lang="ko-KR" altLang="en-US" sz="2900">
+                <a:latin typeface="안상수2006굵은"/>
+                <a:ea typeface="안상수2006굵은"/>
+              </a:rPr>
+              <a:t>인지과학기반 영어 읽기 교수 모형에 관한 연구- 읽기 능력, 인지적 유연성, 마인드셋을 중심으로 -</a:t>
             </a:r>
             <a:endParaRPr lang="ko-KR" altLang="en-US">
               <a:latin typeface="안상수2006굵은"/>
@@ -4571,15 +4749,71 @@
             </a:endParaRPr>
           </a:p>
           <a:p>
-            <a:pPr>
-              <a:defRPr/>
-            </a:pPr>
+            <a:pPr marL="0" indent="0">
+              <a:buNone/>
+              <a:defRPr/>
+            </a:pPr>
+            <a:r>
+              <a:rPr lang="ko-KR" altLang="en-US" sz="2100">
+                <a:latin typeface="안상수2006굵은"/>
+                <a:ea typeface="안상수2006굵은"/>
+              </a:rPr>
+              <a:t>   </a:t>
+            </a:r>
+            <a:r>
+              <a:rPr lang="en-US" altLang="ko-KR" sz="2100">
+                <a:latin typeface="안상수2006굵은"/>
+                <a:ea typeface="안상수2006굵은"/>
+              </a:rPr>
+              <a:t> </a:t>
+            </a:r>
+            <a:r>
+              <a:rPr lang="ko-KR" altLang="en-US" sz="2100">
+                <a:latin typeface="안상수2006굵은"/>
+                <a:ea typeface="안상수2006굵은"/>
+              </a:rPr>
+              <a:t> </a:t>
+            </a:r>
+            <a:r>
+              <a:rPr lang="en-US" altLang="ko-KR" sz="2100">
+                <a:latin typeface="안상수2006굵은"/>
+                <a:ea typeface="안상수2006굵은"/>
+              </a:rPr>
+              <a:t>-신수정. "인지과학기반 영어 읽기 교수 모형에 관한 연구." 국내박사학위논문 연세대학교 대학원, 2017. 서울</a:t>
+            </a:r>
+            <a:endParaRPr lang="en-US" altLang="ko-KR" sz="2100">
+              <a:latin typeface="안상수2006굵은"/>
+              <a:ea typeface="안상수2006굵은"/>
+            </a:endParaRPr>
+          </a:p>
+          <a:p>
+            <a:pPr marL="0" indent="0">
+              <a:buNone/>
+              <a:defRPr/>
+            </a:pPr>
+            <a:endParaRPr lang="en-US" altLang="ko-KR">
+              <a:latin typeface="안상수2006굵은"/>
+              <a:ea typeface="안상수2006굵은"/>
+            </a:endParaRPr>
+          </a:p>
+          <a:p>
+            <a:pPr marL="0" indent="0">
+              <a:buNone/>
+              <a:defRPr/>
+            </a:pPr>
+            <a:r>
+              <a:rPr lang="en-US" altLang="ko-KR">
+                <a:latin typeface="안상수2006굵은"/>
+                <a:ea typeface="안상수2006굵은"/>
+              </a:rPr>
+              <a:t>-&gt; 인지과학과 읽기 교육의 융합으로 새롭게 수렴된 인지과학기반 영어 읽기 교수모형을 개발</a:t>
+            </a:r>
             <a:r>
               <a:rPr lang="ko-KR" altLang="en-US">
                 <a:latin typeface="안상수2006굵은"/>
                 <a:ea typeface="안상수2006굵은"/>
               </a:rPr>
-              <a:t>경제학 </a:t>
+              <a:t>    </a:t>
             </a:r>
             <a:endParaRPr lang="ko-KR" altLang="en-US">
               <a:latin typeface="안상수2006굵은"/>
@@ -4596,29 +4830,23 @@
                 <a:latin typeface="안상수2006굵은"/>
                 <a:ea typeface="안상수2006굵은"/>
               </a:rPr>
-              <a:t>  </a:t>
+              <a:t>    교</a:t>
             </a:r>
             <a:r>
               <a:rPr lang="en-US" altLang="ko-KR">
                 <a:latin typeface="안상수2006굵은"/>
                 <a:ea typeface="안상수2006굵은"/>
               </a:rPr>
-              <a:t>-</a:t>
-            </a:r>
-            <a:r>
-              <a:rPr lang="ko-KR" altLang="en-US">
-                <a:latin typeface="안상수2006굵은"/>
-                <a:ea typeface="안상수2006굵은"/>
-              </a:rPr>
-              <a:t> 행동 재무의 개발</a:t>
-            </a:r>
-            <a:endParaRPr lang="ko-KR" altLang="en-US">
+              <a:t>실 현장에 적용하여 초등 학습자들의 읽기 능력, 인지적 유연성, 마인드셋에 미치는 </a:t>
+            </a:r>
+            <a:endParaRPr lang="en-US" altLang="ko-KR">
               <a:latin typeface="안상수2006굵은"/>
               <a:ea typeface="안상수2006굵은"/>
             </a:endParaRPr>
           </a:p>
           <a:p>
-            <a:pPr>
+            <a:pPr marL="0" indent="0">
+              <a:buNone/>
               <a:defRPr/>
             </a:pPr>
             <a:r>
@@ -4626,9 +4854,16 @@
                 <a:latin typeface="안상수2006굵은"/>
                 <a:ea typeface="안상수2006굵은"/>
               </a:rPr>
-              <a:t>수리철학</a:t>
-            </a:r>
-            <a:endParaRPr lang="ko-KR" altLang="en-US">
+              <a:t>    </a:t>
+            </a:r>
+            <a:r>
+              <a:rPr lang="en-US" altLang="ko-KR">
+                <a:latin typeface="안상수2006굵은"/>
+                <a:ea typeface="안상수2006굵은"/>
+              </a:rPr>
+              <a:t>영향을 분석함으로써 인지과학기반 영어 읽기 교수 모형의 효율성을 입증</a:t>
+            </a:r>
+            <a:endParaRPr lang="en-US" altLang="ko-KR">
               <a:latin typeface="안상수2006굵은"/>
               <a:ea typeface="안상수2006굵은"/>
             </a:endParaRPr>
@@ -4638,191 +4873,7 @@
               <a:buNone/>
               <a:defRPr/>
             </a:pPr>
-            <a:r>
-              <a:rPr lang="ko-KR" altLang="en-US">
-                <a:latin typeface="안상수2006굵은"/>
-                <a:ea typeface="안상수2006굵은"/>
-              </a:rPr>
-              <a:t>  </a:t>
-            </a:r>
-            <a:r>
-              <a:rPr lang="en-US" altLang="ko-KR">
-                <a:latin typeface="안상수2006굵은"/>
-                <a:ea typeface="안상수2006굵은"/>
-              </a:rPr>
-              <a:t>-</a:t>
-            </a:r>
-            <a:r>
-              <a:rPr lang="ko-KR" altLang="en-US">
-                <a:latin typeface="안상수2006굵은"/>
-                <a:ea typeface="안상수2006굵은"/>
-              </a:rPr>
-              <a:t> 인공지능</a:t>
-            </a:r>
-            <a:r>
-              <a:rPr lang="en-US" altLang="ko-KR">
-                <a:latin typeface="안상수2006굵은"/>
-                <a:ea typeface="안상수2006굵은"/>
-              </a:rPr>
-              <a:t>,</a:t>
-            </a:r>
-            <a:r>
-              <a:rPr lang="ko-KR" altLang="en-US">
-                <a:latin typeface="안상수2006굵은"/>
-                <a:ea typeface="안상수2006굵은"/>
-              </a:rPr>
-              <a:t> 설득과 강압의 많은 이론 탄생</a:t>
-            </a:r>
-            <a:endParaRPr lang="ko-KR" altLang="en-US">
-              <a:latin typeface="안상수2006굵은"/>
-              <a:ea typeface="안상수2006굵은"/>
-            </a:endParaRPr>
-          </a:p>
-          <a:p>
-            <a:pPr>
-              <a:defRPr/>
-            </a:pPr>
-            <a:r>
-              <a:rPr lang="ko-KR" altLang="en-US">
-                <a:latin typeface="안상수2006굵은"/>
-                <a:ea typeface="안상수2006굵은"/>
-              </a:rPr>
-              <a:t>언어철학과 인식론</a:t>
-            </a:r>
-            <a:endParaRPr lang="ko-KR" altLang="en-US">
-              <a:latin typeface="안상수2006굵은"/>
-              <a:ea typeface="안상수2006굵은"/>
-            </a:endParaRPr>
-          </a:p>
-          <a:p>
-            <a:pPr marL="0" indent="0">
-              <a:buNone/>
-              <a:defRPr/>
-            </a:pPr>
-            <a:r>
-              <a:rPr lang="ko-KR" altLang="en-US">
-                <a:latin typeface="안상수2006굵은"/>
-                <a:ea typeface="안상수2006굵은"/>
-              </a:rPr>
-              <a:t>  </a:t>
-            </a:r>
-            <a:r>
-              <a:rPr lang="en-US" altLang="ko-KR">
-                <a:latin typeface="안상수2006굵은"/>
-                <a:ea typeface="안상수2006굵은"/>
-              </a:rPr>
-              <a:t>-</a:t>
-            </a:r>
-            <a:r>
-              <a:rPr lang="ko-KR" altLang="en-US">
-                <a:latin typeface="안상수2006굵은"/>
-                <a:ea typeface="안상수2006굵은"/>
-              </a:rPr>
-              <a:t> 현대 언어학의 중대한 계파 구성</a:t>
-            </a:r>
-            <a:endParaRPr lang="ko-KR" altLang="en-US">
-              <a:latin typeface="안상수2006굵은"/>
-              <a:ea typeface="안상수2006굵은"/>
-            </a:endParaRPr>
-          </a:p>
-          <a:p>
-            <a:pPr>
-              <a:defRPr/>
-            </a:pPr>
-            <a:r>
-              <a:rPr lang="ko-KR" altLang="en-US">
-                <a:latin typeface="안상수2006굵은"/>
-                <a:ea typeface="안상수2006굵은"/>
-              </a:rPr>
-              <a:t>말</a:t>
-            </a:r>
-            <a:r>
-              <a:rPr lang="en-US" altLang="ko-KR">
-                <a:latin typeface="안상수2006굵은"/>
-                <a:ea typeface="안상수2006굵은"/>
-              </a:rPr>
-              <a:t>,</a:t>
-            </a:r>
-            <a:r>
-              <a:rPr lang="ko-KR" altLang="en-US">
-                <a:latin typeface="안상수2006굵은"/>
-                <a:ea typeface="안상수2006굵은"/>
-              </a:rPr>
-              <a:t> 청각적 처리</a:t>
-            </a:r>
-            <a:r>
-              <a:rPr lang="en-US" altLang="ko-KR">
-                <a:latin typeface="안상수2006굵은"/>
-                <a:ea typeface="안상수2006굵은"/>
-              </a:rPr>
-              <a:t>,</a:t>
-            </a:r>
-            <a:r>
-              <a:rPr lang="ko-KR" altLang="en-US">
-                <a:latin typeface="안상수2006굵은"/>
-                <a:ea typeface="안상수2006굵은"/>
-              </a:rPr>
-              <a:t> 시각적 지각까지 뇌의 특정 기능적 시스템 및 장애를 이해하는데 영향</a:t>
-            </a:r>
-            <a:endParaRPr lang="ko-KR" altLang="en-US">
-              <a:latin typeface="안상수2006굵은"/>
-              <a:ea typeface="안상수2006굵은"/>
-            </a:endParaRPr>
-          </a:p>
-          <a:p>
-            <a:pPr>
-              <a:defRPr/>
-            </a:pPr>
-            <a:r>
-              <a:rPr lang="ko-KR" altLang="en-US">
-                <a:latin typeface="안상수2006굵은"/>
-                <a:ea typeface="안상수2006굵은"/>
-              </a:rPr>
-              <a:t>난독증</a:t>
-            </a:r>
-            <a:r>
-              <a:rPr lang="en-US" altLang="ko-KR">
-                <a:latin typeface="안상수2006굵은"/>
-                <a:ea typeface="안상수2006굵은"/>
-              </a:rPr>
-              <a:t>,</a:t>
-            </a:r>
-            <a:r>
-              <a:rPr lang="ko-KR" altLang="en-US">
-                <a:latin typeface="안상수2006굵은"/>
-                <a:ea typeface="안상수2006굵은"/>
-              </a:rPr>
-              <a:t> 시각결여</a:t>
-            </a:r>
-            <a:r>
-              <a:rPr lang="en-US" altLang="ko-KR">
-                <a:latin typeface="안상수2006굵은"/>
-                <a:ea typeface="안상수2006굵은"/>
-              </a:rPr>
-              <a:t>(</a:t>
-            </a:r>
-            <a:r>
-              <a:rPr lang="ko-KR" altLang="en-US">
-                <a:latin typeface="안상수2006굵은"/>
-                <a:ea typeface="안상수2006굵은"/>
-              </a:rPr>
-              <a:t>무시증</a:t>
-            </a:r>
-            <a:r>
-              <a:rPr lang="en-US" altLang="ko-KR">
-                <a:latin typeface="안상수2006굵은"/>
-                <a:ea typeface="안상수2006굵은"/>
-              </a:rPr>
-              <a:t>),</a:t>
-            </a:r>
-            <a:r>
-              <a:rPr lang="ko-KR" altLang="en-US">
-                <a:latin typeface="안상수2006굵은"/>
-                <a:ea typeface="안상수2006굵은"/>
-              </a:rPr>
-              <a:t> 편측공간무시와 같은 특정 기능 장애의 결과와 근본 원인을 밝혀내는데 도움</a:t>
-            </a:r>
-            <a:endParaRPr lang="ko-KR" altLang="en-US">
+            <a:endParaRPr lang="en-US" altLang="ko-KR">
               <a:latin typeface="안상수2006굵은"/>
               <a:ea typeface="안상수2006굵은"/>
             </a:endParaRPr>
@@ -4882,232 +4933,6 @@
             </a:pPr>
             <a:r>
               <a:rPr lang="en-US" altLang="ko-KR"/>
-              <a:t>4. Example CG</a:t>
-            </a:r>
-            <a:endParaRPr lang="en-US" altLang="ko-KR"/>
-          </a:p>
-        </p:txBody>
-      </p:sp>
-      <p:sp>
-        <p:nvSpPr>
-          <p:cNvPr id="3" name="내용 개체 틀 2"/>
-          <p:cNvSpPr>
-            <a:spLocks noGrp="1"/>
-          </p:cNvSpPr>
-          <p:nvPr>
-            <p:ph idx="1"/>
-          </p:nvPr>
-        </p:nvSpPr>
-        <p:spPr>
-          <a:xfrm>
-            <a:off x="609601" y="1997074"/>
-            <a:ext cx="10972798" cy="4525963"/>
-          </a:xfrm>
-        </p:spPr>
-        <p:txBody>
-          <a:bodyPr/>
-          <a:lstStyle/>
-          <a:p>
-            <a:pPr>
-              <a:defRPr/>
-            </a:pPr>
-            <a:r>
-              <a:rPr lang="ko-KR" altLang="en-US" sz="2900">
-                <a:latin typeface="안상수2006굵은"/>
-                <a:ea typeface="안상수2006굵은"/>
-              </a:rPr>
-              <a:t>인지과학기반 영어 읽기 교수 모형에 관한 연구- 읽기 능력, 인지적 유연성, 마인드셋을 중심으로 -</a:t>
-            </a:r>
-            <a:endParaRPr lang="ko-KR" altLang="en-US">
-              <a:latin typeface="안상수2006굵은"/>
-              <a:ea typeface="안상수2006굵은"/>
-            </a:endParaRPr>
-          </a:p>
-          <a:p>
-            <a:pPr marL="0" indent="0">
-              <a:buNone/>
-              <a:defRPr/>
-            </a:pPr>
-            <a:r>
-              <a:rPr lang="ko-KR" altLang="en-US" sz="2100">
-                <a:latin typeface="안상수2006굵은"/>
-                <a:ea typeface="안상수2006굵은"/>
-              </a:rPr>
-              <a:t>   </a:t>
-            </a:r>
-            <a:r>
-              <a:rPr lang="en-US" altLang="ko-KR" sz="2100">
-                <a:latin typeface="안상수2006굵은"/>
-                <a:ea typeface="안상수2006굵은"/>
-              </a:rPr>
-              <a:t> </a:t>
-            </a:r>
-            <a:r>
-              <a:rPr lang="ko-KR" altLang="en-US" sz="2100">
-                <a:latin typeface="안상수2006굵은"/>
-                <a:ea typeface="안상수2006굵은"/>
-              </a:rPr>
-              <a:t> </a:t>
-            </a:r>
-            <a:r>
-              <a:rPr lang="en-US" altLang="ko-KR" sz="2100">
-                <a:latin typeface="안상수2006굵은"/>
-                <a:ea typeface="안상수2006굵은"/>
-              </a:rPr>
-              <a:t>-신수정. "인지과학기반 영어 읽기 교수 모형에 관한 연구." 국내박사학위논문 연세대학교 대학원, 2017. 서울</a:t>
-            </a:r>
-            <a:endParaRPr lang="en-US" altLang="ko-KR" sz="2100">
-              <a:latin typeface="안상수2006굵은"/>
-              <a:ea typeface="안상수2006굵은"/>
-            </a:endParaRPr>
-          </a:p>
-          <a:p>
-            <a:pPr marL="0" indent="0">
-              <a:buNone/>
-              <a:defRPr/>
-            </a:pPr>
-            <a:endParaRPr lang="en-US" altLang="ko-KR">
-              <a:latin typeface="안상수2006굵은"/>
-              <a:ea typeface="안상수2006굵은"/>
-            </a:endParaRPr>
-          </a:p>
-          <a:p>
-            <a:pPr marL="0" indent="0">
-              <a:buNone/>
-              <a:defRPr/>
-            </a:pPr>
-            <a:r>
-              <a:rPr lang="en-US" altLang="ko-KR">
-                <a:latin typeface="안상수2006굵은"/>
-                <a:ea typeface="안상수2006굵은"/>
-              </a:rPr>
-              <a:t>-&gt; 인지과학과 읽기 교육의 융합으로 새롭게 수렴된 인지과학기반 영어 읽기 교수모형을 개발</a:t>
-            </a:r>
-            <a:r>
-              <a:rPr lang="ko-KR" altLang="en-US">
-                <a:latin typeface="안상수2006굵은"/>
-                <a:ea typeface="안상수2006굵은"/>
-              </a:rPr>
-              <a:t>    </a:t>
-            </a:r>
-            <a:endParaRPr lang="ko-KR" altLang="en-US">
-              <a:latin typeface="안상수2006굵은"/>
-              <a:ea typeface="안상수2006굵은"/>
-            </a:endParaRPr>
-          </a:p>
-          <a:p>
-            <a:pPr marL="0" indent="0">
-              <a:buNone/>
-              <a:defRPr/>
-            </a:pPr>
-            <a:r>
-              <a:rPr lang="ko-KR" altLang="en-US">
-                <a:latin typeface="안상수2006굵은"/>
-                <a:ea typeface="안상수2006굵은"/>
-              </a:rPr>
-              <a:t>    교</a:t>
-            </a:r>
-            <a:r>
-              <a:rPr lang="en-US" altLang="ko-KR">
-                <a:latin typeface="안상수2006굵은"/>
-                <a:ea typeface="안상수2006굵은"/>
-              </a:rPr>
-              <a:t>실 현장에 적용하여 초등 학습자들의 읽기 능력, 인지적 유연성, 마인드셋에 미치는 </a:t>
-            </a:r>
-            <a:endParaRPr lang="en-US" altLang="ko-KR">
-              <a:latin typeface="안상수2006굵은"/>
-              <a:ea typeface="안상수2006굵은"/>
-            </a:endParaRPr>
-          </a:p>
-          <a:p>
-            <a:pPr marL="0" indent="0">
-              <a:buNone/>
-              <a:defRPr/>
-            </a:pPr>
-            <a:r>
-              <a:rPr lang="ko-KR" altLang="en-US">
-                <a:latin typeface="안상수2006굵은"/>
-                <a:ea typeface="안상수2006굵은"/>
-              </a:rPr>
-              <a:t>    </a:t>
-            </a:r>
-            <a:r>
-              <a:rPr lang="en-US" altLang="ko-KR">
-                <a:latin typeface="안상수2006굵은"/>
-                <a:ea typeface="안상수2006굵은"/>
-              </a:rPr>
-              <a:t>영향을 분석함으로써 인지과학기반 영어 읽기 교수 모형의 효율성을 입증</a:t>
-            </a:r>
-            <a:endParaRPr lang="en-US" altLang="ko-KR">
-              <a:latin typeface="안상수2006굵은"/>
-              <a:ea typeface="안상수2006굵은"/>
-            </a:endParaRPr>
-          </a:p>
-          <a:p>
-            <a:pPr marL="0" indent="0">
-              <a:buNone/>
-              <a:defRPr/>
-            </a:pPr>
-            <a:endParaRPr lang="en-US" altLang="ko-KR">
-              <a:latin typeface="안상수2006굵은"/>
-              <a:ea typeface="안상수2006굵은"/>
-            </a:endParaRPr>
-          </a:p>
-        </p:txBody>
-      </p:sp>
-    </p:spTree>
-  </p:cSld>
-  <p:clrMapOvr>
-    <a:masterClrMapping/>
-  </p:clrMapOvr>
-  <mc:AlternateContent xmlns:mc="http://schemas.openxmlformats.org/markup-compatibility/2006">
-    <mc:Choice xmlns:p14="http://schemas.microsoft.com/office/powerpoint/2010/main" Requires="p14">
-      <p:transition xmlns:mc="http://schemas.openxmlformats.org/markup-compatibility/2006" xmlns:p14="http://schemas.microsoft.com/office/powerpoint/2010/main" mc:Ignorable="p14" p14:dur="500"/>
-    </mc:Choice>
-    <mc:Fallback>
-      <p:transition/>
-    </mc:Fallback>
-  </mc:AlternateContent>
-</p:sld>
-</file>
-
-<file path=ppt/slides/slide15.xml><?xml version="1.0" encoding="utf-8"?>
-<p:sld xmlns:r="http://schemas.openxmlformats.org/officeDocument/2006/relationships" xmlns:c="http://schemas.openxmlformats.org/drawingml/2006/chart" xmlns:a="http://schemas.openxmlformats.org/drawingml/2006/main" xmlns:dgm="http://schemas.openxmlformats.org/drawingml/2006/diagram" xmlns:dsp="http://schemas.microsoft.com/office/drawing/2008/diagram" xmlns:p="http://schemas.openxmlformats.org/presentationml/2006/main">
-  <p:cSld>
-    <p:spTree>
-      <p:nvGrpSpPr>
-        <p:cNvPr id="1" name=""/>
-        <p:cNvGrpSpPr/>
-        <p:nvPr/>
-      </p:nvGrpSpPr>
-      <p:grpSpPr>
-        <a:xfrm>
-          <a:off x="0" y="0"/>
-          <a:ext cx="0" cy="0"/>
-          <a:chOff x="0" y="0"/>
-          <a:chExt cx="0" cy="0"/>
-        </a:xfrm>
-      </p:grpSpPr>
-      <p:sp>
-        <p:nvSpPr>
-          <p:cNvPr id="2" name="제목 1"/>
-          <p:cNvSpPr>
-            <a:spLocks noGrp="1"/>
-          </p:cNvSpPr>
-          <p:nvPr>
-            <p:ph type="title" idx="0"/>
-          </p:nvPr>
-        </p:nvSpPr>
-        <p:spPr/>
-        <p:txBody>
-          <a:bodyPr/>
-          <a:lstStyle/>
-          <a:p>
-            <a:pPr>
-              <a:defRPr/>
-            </a:pPr>
-            <a:r>
-              <a:rPr lang="en-US" altLang="ko-KR"/>
               <a:t>5.</a:t>
             </a:r>
             <a:r>
@@ -7457,7 +7282,7 @@
                 <a:latin typeface="안상수2006굵은"/>
                 <a:ea typeface="안상수2006굵은"/>
               </a:rPr>
-              <a:t>사람들은 어떻게 새로운 문장들을 이해할 수 있을ᄁᆞ</a:t>
+              <a:t>사람들은 어떻게 새로운 문장들을 이해할 수 있을까</a:t>
             </a:r>
             <a:r>
               <a:rPr xmlns:mc="http://schemas.openxmlformats.org/markup-compatibility/2006" xmlns:hp="http://schemas.haansoft.com/office/presentation/8.0" lang="en-US" altLang="ko-KR" sz="2500" b="0" i="0" u="none" strike="noStrike" mc:Ignorable="hp" hp:hslEmbossed="0">

</xml_diff>